<commit_message>
Updates to solve blurring in some slides.
</commit_message>
<xml_diff>
--- a/dev/20200504/ncw/Nathaniel Watts/UISpec Presentation/UISpecPresGroup20.pptx
+++ b/dev/20200504/ncw/Nathaniel Watts/UISpec Presentation/UISpecPresGroup20.pptx
@@ -155,7 +155,7 @@
 <file path=ppt/revisionInfo.xml><?xml version="1.0" encoding="utf-8"?>
 <p1510:revInfo xmlns:a="http://schemas.openxmlformats.org/drawingml/2006/main" xmlns:r="http://schemas.openxmlformats.org/officeDocument/2006/relationships" xmlns:p1510="http://schemas.microsoft.com/office/powerpoint/2015/10/main">
   <p1510:revLst>
-    <p1510:client id="{D20B6939-C64F-45AB-8FC1-E98E92BF2F38}" v="101" dt="2020-05-04T13:48:35.732"/>
+    <p1510:client id="{D20B6939-C64F-45AB-8FC1-E98E92BF2F38}" v="105" dt="2020-05-04T14:14:15.983"/>
   </p1510:revLst>
 </p1510:revInfo>
 </file>
@@ -165,7 +165,7 @@
   <pc:docChgLst>
     <pc:chgData name="Nathaniel Watts" userId="b5f9068336b075df" providerId="LiveId" clId="{D20B6939-C64F-45AB-8FC1-E98E92BF2F38}"/>
     <pc:docChg chg="undo custSel modSld">
-      <pc:chgData name="Nathaniel Watts" userId="b5f9068336b075df" providerId="LiveId" clId="{D20B6939-C64F-45AB-8FC1-E98E92BF2F38}" dt="2020-05-04T13:48:35.732" v="1243"/>
+      <pc:chgData name="Nathaniel Watts" userId="b5f9068336b075df" providerId="LiveId" clId="{D20B6939-C64F-45AB-8FC1-E98E92BF2F38}" dt="2020-05-04T14:15:13.647" v="1274" actId="14100"/>
       <pc:docMkLst>
         <pc:docMk/>
       </pc:docMkLst>
@@ -225,17 +225,41 @@
         </pc:picChg>
       </pc:sldChg>
       <pc:sldChg chg="addSp delSp modSp">
-        <pc:chgData name="Nathaniel Watts" userId="b5f9068336b075df" providerId="LiveId" clId="{D20B6939-C64F-45AB-8FC1-E98E92BF2F38}" dt="2020-05-04T13:37:48.713" v="1099" actId="167"/>
+        <pc:chgData name="Nathaniel Watts" userId="b5f9068336b075df" providerId="LiveId" clId="{D20B6939-C64F-45AB-8FC1-E98E92BF2F38}" dt="2020-05-04T14:15:13.647" v="1274" actId="14100"/>
         <pc:sldMkLst>
           <pc:docMk/>
           <pc:sldMk cId="0" sldId="258"/>
         </pc:sldMkLst>
         <pc:picChg chg="add mod ord">
-          <ac:chgData name="Nathaniel Watts" userId="b5f9068336b075df" providerId="LiveId" clId="{D20B6939-C64F-45AB-8FC1-E98E92BF2F38}" dt="2020-05-04T11:52:10.957" v="453" actId="167"/>
+          <ac:chgData name="Nathaniel Watts" userId="b5f9068336b075df" providerId="LiveId" clId="{D20B6939-C64F-45AB-8FC1-E98E92BF2F38}" dt="2020-05-04T14:14:32.947" v="1264" actId="1076"/>
           <ac:picMkLst>
             <pc:docMk/>
             <pc:sldMk cId="0" sldId="258"/>
             <ac:picMk id="3" creationId="{41B613ED-1E34-4ABE-B23E-3682398D3693}"/>
+          </ac:picMkLst>
+        </pc:picChg>
+        <pc:picChg chg="add del mod">
+          <ac:chgData name="Nathaniel Watts" userId="b5f9068336b075df" providerId="LiveId" clId="{D20B6939-C64F-45AB-8FC1-E98E92BF2F38}" dt="2020-05-04T14:13:54.289" v="1258" actId="478"/>
+          <ac:picMkLst>
+            <pc:docMk/>
+            <pc:sldMk cId="0" sldId="258"/>
+            <ac:picMk id="4" creationId="{3AED09D2-56AB-4111-88E6-51CA67F0702C}"/>
+          </ac:picMkLst>
+        </pc:picChg>
+        <pc:picChg chg="add del mod modCrop">
+          <ac:chgData name="Nathaniel Watts" userId="b5f9068336b075df" providerId="LiveId" clId="{D20B6939-C64F-45AB-8FC1-E98E92BF2F38}" dt="2020-05-04T14:13:15.058" v="1251"/>
+          <ac:picMkLst>
+            <pc:docMk/>
+            <pc:sldMk cId="0" sldId="258"/>
+            <ac:picMk id="4" creationId="{8A6804A9-62CD-4076-8E19-CEFC5957E75E}"/>
+          </ac:picMkLst>
+        </pc:picChg>
+        <pc:picChg chg="add mod ord modCrop">
+          <ac:chgData name="Nathaniel Watts" userId="b5f9068336b075df" providerId="LiveId" clId="{D20B6939-C64F-45AB-8FC1-E98E92BF2F38}" dt="2020-05-04T14:15:13.647" v="1274" actId="14100"/>
+          <ac:picMkLst>
+            <pc:docMk/>
+            <pc:sldMk cId="0" sldId="258"/>
+            <ac:picMk id="6" creationId="{B73B9394-4AEE-431A-A0A8-E37514D7B38E}"/>
           </ac:picMkLst>
         </pc:picChg>
         <pc:picChg chg="add mod ord">
@@ -254,8 +278,8 @@
             <ac:picMk id="94" creationId="{00000000-0000-0000-0000-000000000000}"/>
           </ac:picMkLst>
         </pc:picChg>
-        <pc:picChg chg="mod">
-          <ac:chgData name="Nathaniel Watts" userId="b5f9068336b075df" providerId="LiveId" clId="{D20B6939-C64F-45AB-8FC1-E98E92BF2F38}" dt="2020-05-04T11:51:55.131" v="447" actId="1076"/>
+        <pc:picChg chg="add del mod">
+          <ac:chgData name="Nathaniel Watts" userId="b5f9068336b075df" providerId="LiveId" clId="{D20B6939-C64F-45AB-8FC1-E98E92BF2F38}" dt="2020-05-04T14:13:41.146" v="1253" actId="478"/>
           <ac:picMkLst>
             <pc:docMk/>
             <pc:sldMk cId="0" sldId="258"/>
@@ -17905,25 +17929,37 @@
       </p:pic>
       <p:pic>
         <p:nvPicPr>
-          <p:cNvPr id="95" name="Picture 94"/>
-          <p:cNvPicPr/>
+          <p:cNvPr id="6" name="Picture 5" descr="A screenshot of a cell phone&#10;&#10;Description automatically generated">
+            <a:extLst>
+              <a:ext uri="{FF2B5EF4-FFF2-40B4-BE49-F238E27FC236}">
+                <a16:creationId xmlns:a16="http://schemas.microsoft.com/office/drawing/2014/main" id="{B73B9394-4AEE-431A-A0A8-E37514D7B38E}"/>
+              </a:ext>
+            </a:extLst>
+          </p:cNvPr>
+          <p:cNvPicPr>
+            <a:picLocks noChangeAspect="1"/>
+          </p:cNvPicPr>
           <p:nvPr/>
         </p:nvPicPr>
-        <p:blipFill>
-          <a:blip r:embed="rId4"/>
+        <p:blipFill rotWithShape="1">
+          <a:blip r:embed="rId4">
+            <a:extLst>
+              <a:ext uri="{28A0092B-C50C-407E-A947-70E740481C1C}">
+                <a14:useLocalDpi xmlns:a14="http://schemas.microsoft.com/office/drawing/2010/main" val="0"/>
+              </a:ext>
+            </a:extLst>
+          </a:blip>
+          <a:srcRect r="75000"/>
           <a:stretch/>
         </p:blipFill>
         <p:spPr>
           <a:xfrm>
-            <a:off x="0" y="671"/>
-            <a:ext cx="2286720" cy="5146920"/>
-          </a:xfrm>
-          <a:prstGeom prst="rect">
-            <a:avLst/>
-          </a:prstGeom>
-          <a:ln>
-            <a:noFill/>
-          </a:ln>
+            <a:off x="0" y="2381"/>
+            <a:ext cx="2319618" cy="5145882"/>
+          </a:xfrm>
+          <a:prstGeom prst="rect">
+            <a:avLst/>
+          </a:prstGeom>
         </p:spPr>
       </p:pic>
       <p:sp>

</xml_diff>